<commit_message>
fixed blogs layout for larger screens and README img links
</commit_message>
<xml_diff>
--- a/ppt/portfolio-slidedeck.pptx
+++ b/ppt/portfolio-slidedeck.pptx
@@ -8,6 +8,15 @@
     <p:sldId id="257" r:id="rId2"/>
     <p:sldId id="259" r:id="rId3"/>
     <p:sldId id="258" r:id="rId4"/>
+    <p:sldId id="260" r:id="rId5"/>
+    <p:sldId id="261" r:id="rId6"/>
+    <p:sldId id="262" r:id="rId7"/>
+    <p:sldId id="263" r:id="rId8"/>
+    <p:sldId id="264" r:id="rId9"/>
+    <p:sldId id="265" r:id="rId10"/>
+    <p:sldId id="266" r:id="rId11"/>
+    <p:sldId id="267" r:id="rId12"/>
+    <p:sldId id="268" r:id="rId13"/>
   </p:sldIdLst>
   <p:sldSz cx="12192000" cy="6858000"/>
   <p:notesSz cx="6858000" cy="9144000"/>
@@ -263,7 +272,7 @@
           <a:p>
             <a:fld id="{85FE125A-FC3E-4D83-B87B-74F19FFFCEE6}" type="datetimeFigureOut">
               <a:rPr lang="en-AU" smtClean="0"/>
-              <a:t>2/03/2022</a:t>
+              <a:t>3/03/2022</a:t>
             </a:fld>
             <a:endParaRPr lang="en-AU"/>
           </a:p>
@@ -463,7 +472,7 @@
           <a:p>
             <a:fld id="{85FE125A-FC3E-4D83-B87B-74F19FFFCEE6}" type="datetimeFigureOut">
               <a:rPr lang="en-AU" smtClean="0"/>
-              <a:t>2/03/2022</a:t>
+              <a:t>3/03/2022</a:t>
             </a:fld>
             <a:endParaRPr lang="en-AU"/>
           </a:p>
@@ -673,7 +682,7 @@
           <a:p>
             <a:fld id="{85FE125A-FC3E-4D83-B87B-74F19FFFCEE6}" type="datetimeFigureOut">
               <a:rPr lang="en-AU" smtClean="0"/>
-              <a:t>2/03/2022</a:t>
+              <a:t>3/03/2022</a:t>
             </a:fld>
             <a:endParaRPr lang="en-AU"/>
           </a:p>
@@ -873,7 +882,7 @@
           <a:p>
             <a:fld id="{85FE125A-FC3E-4D83-B87B-74F19FFFCEE6}" type="datetimeFigureOut">
               <a:rPr lang="en-AU" smtClean="0"/>
-              <a:t>2/03/2022</a:t>
+              <a:t>3/03/2022</a:t>
             </a:fld>
             <a:endParaRPr lang="en-AU"/>
           </a:p>
@@ -1149,7 +1158,7 @@
           <a:p>
             <a:fld id="{85FE125A-FC3E-4D83-B87B-74F19FFFCEE6}" type="datetimeFigureOut">
               <a:rPr lang="en-AU" smtClean="0"/>
-              <a:t>2/03/2022</a:t>
+              <a:t>3/03/2022</a:t>
             </a:fld>
             <a:endParaRPr lang="en-AU"/>
           </a:p>
@@ -1417,7 +1426,7 @@
           <a:p>
             <a:fld id="{85FE125A-FC3E-4D83-B87B-74F19FFFCEE6}" type="datetimeFigureOut">
               <a:rPr lang="en-AU" smtClean="0"/>
-              <a:t>2/03/2022</a:t>
+              <a:t>3/03/2022</a:t>
             </a:fld>
             <a:endParaRPr lang="en-AU"/>
           </a:p>
@@ -1832,7 +1841,7 @@
           <a:p>
             <a:fld id="{85FE125A-FC3E-4D83-B87B-74F19FFFCEE6}" type="datetimeFigureOut">
               <a:rPr lang="en-AU" smtClean="0"/>
-              <a:t>2/03/2022</a:t>
+              <a:t>3/03/2022</a:t>
             </a:fld>
             <a:endParaRPr lang="en-AU"/>
           </a:p>
@@ -1974,7 +1983,7 @@
           <a:p>
             <a:fld id="{85FE125A-FC3E-4D83-B87B-74F19FFFCEE6}" type="datetimeFigureOut">
               <a:rPr lang="en-AU" smtClean="0"/>
-              <a:t>2/03/2022</a:t>
+              <a:t>3/03/2022</a:t>
             </a:fld>
             <a:endParaRPr lang="en-AU"/>
           </a:p>
@@ -2087,7 +2096,7 @@
           <a:p>
             <a:fld id="{85FE125A-FC3E-4D83-B87B-74F19FFFCEE6}" type="datetimeFigureOut">
               <a:rPr lang="en-AU" smtClean="0"/>
-              <a:t>2/03/2022</a:t>
+              <a:t>3/03/2022</a:t>
             </a:fld>
             <a:endParaRPr lang="en-AU"/>
           </a:p>
@@ -2400,7 +2409,7 @@
           <a:p>
             <a:fld id="{85FE125A-FC3E-4D83-B87B-74F19FFFCEE6}" type="datetimeFigureOut">
               <a:rPr lang="en-AU" smtClean="0"/>
-              <a:t>2/03/2022</a:t>
+              <a:t>3/03/2022</a:t>
             </a:fld>
             <a:endParaRPr lang="en-AU"/>
           </a:p>
@@ -2689,7 +2698,7 @@
           <a:p>
             <a:fld id="{85FE125A-FC3E-4D83-B87B-74F19FFFCEE6}" type="datetimeFigureOut">
               <a:rPr lang="en-AU" smtClean="0"/>
-              <a:t>2/03/2022</a:t>
+              <a:t>3/03/2022</a:t>
             </a:fld>
             <a:endParaRPr lang="en-AU"/>
           </a:p>
@@ -2932,7 +2941,7 @@
           <a:p>
             <a:fld id="{85FE125A-FC3E-4D83-B87B-74F19FFFCEE6}" type="datetimeFigureOut">
               <a:rPr lang="en-AU" smtClean="0"/>
-              <a:t>2/03/2022</a:t>
+              <a:t>3/03/2022</a:t>
             </a:fld>
             <a:endParaRPr lang="en-AU"/>
           </a:p>
@@ -3420,6 +3429,276 @@
 </p:sld>
 </file>
 
+<file path=ppt/slides/slide10.xml><?xml version="1.0" encoding="utf-8"?>
+<p:sld xmlns:a="http://schemas.openxmlformats.org/drawingml/2006/main" xmlns:r="http://schemas.openxmlformats.org/officeDocument/2006/relationships" xmlns:p="http://schemas.openxmlformats.org/presentationml/2006/main">
+  <p:cSld>
+    <p:spTree>
+      <p:nvGrpSpPr>
+        <p:cNvPr id="1" name=""/>
+        <p:cNvGrpSpPr/>
+        <p:nvPr/>
+      </p:nvGrpSpPr>
+      <p:grpSpPr>
+        <a:xfrm>
+          <a:off x="0" y="0"/>
+          <a:ext cx="0" cy="0"/>
+          <a:chOff x="0" y="0"/>
+          <a:chExt cx="0" cy="0"/>
+        </a:xfrm>
+      </p:grpSpPr>
+      <p:sp>
+        <p:nvSpPr>
+          <p:cNvPr id="2" name="Title 1">
+            <a:extLst>
+              <a:ext uri="{FF2B5EF4-FFF2-40B4-BE49-F238E27FC236}">
+                <a16:creationId xmlns:a16="http://schemas.microsoft.com/office/drawing/2014/main" id="{F7974661-61FC-4E94-95C6-05145FF33D69}"/>
+              </a:ext>
+            </a:extLst>
+          </p:cNvPr>
+          <p:cNvSpPr>
+            <a:spLocks noGrp="1"/>
+          </p:cNvSpPr>
+          <p:nvPr>
+            <p:ph type="title"/>
+          </p:nvPr>
+        </p:nvSpPr>
+        <p:spPr/>
+        <p:txBody>
+          <a:bodyPr/>
+          <a:lstStyle/>
+          <a:p>
+            <a:pPr algn="ctr"/>
+            <a:r>
+              <a:rPr lang="en-AU" b="1" dirty="0"/>
+              <a:t>Blogs Page</a:t>
+            </a:r>
+          </a:p>
+        </p:txBody>
+      </p:sp>
+      <p:pic>
+        <p:nvPicPr>
+          <p:cNvPr id="8" name="Content Placeholder 7">
+            <a:extLst>
+              <a:ext uri="{FF2B5EF4-FFF2-40B4-BE49-F238E27FC236}">
+                <a16:creationId xmlns:a16="http://schemas.microsoft.com/office/drawing/2014/main" id="{F6C872DF-EECA-458D-8C3C-61417E787BF5}"/>
+              </a:ext>
+            </a:extLst>
+          </p:cNvPr>
+          <p:cNvPicPr>
+            <a:picLocks noGrp="1" noChangeAspect="1"/>
+          </p:cNvPicPr>
+          <p:nvPr>
+            <p:ph idx="1"/>
+          </p:nvPr>
+        </p:nvPicPr>
+        <p:blipFill>
+          <a:blip r:embed="rId2"/>
+          <a:stretch>
+            <a:fillRect/>
+          </a:stretch>
+        </p:blipFill>
+        <p:spPr>
+          <a:xfrm>
+            <a:off x="838200" y="2166162"/>
+            <a:ext cx="10515600" cy="3670264"/>
+          </a:xfrm>
+        </p:spPr>
+      </p:pic>
+    </p:spTree>
+    <p:extLst>
+      <p:ext uri="{BB962C8B-B14F-4D97-AF65-F5344CB8AC3E}">
+        <p14:creationId xmlns:p14="http://schemas.microsoft.com/office/powerpoint/2010/main" val="391082210"/>
+      </p:ext>
+    </p:extLst>
+  </p:cSld>
+  <p:clrMapOvr>
+    <a:masterClrMapping/>
+  </p:clrMapOvr>
+</p:sld>
+</file>
+
+<file path=ppt/slides/slide11.xml><?xml version="1.0" encoding="utf-8"?>
+<p:sld xmlns:a="http://schemas.openxmlformats.org/drawingml/2006/main" xmlns:r="http://schemas.openxmlformats.org/officeDocument/2006/relationships" xmlns:p="http://schemas.openxmlformats.org/presentationml/2006/main">
+  <p:cSld>
+    <p:spTree>
+      <p:nvGrpSpPr>
+        <p:cNvPr id="1" name=""/>
+        <p:cNvGrpSpPr/>
+        <p:nvPr/>
+      </p:nvGrpSpPr>
+      <p:grpSpPr>
+        <a:xfrm>
+          <a:off x="0" y="0"/>
+          <a:ext cx="0" cy="0"/>
+          <a:chOff x="0" y="0"/>
+          <a:chExt cx="0" cy="0"/>
+        </a:xfrm>
+      </p:grpSpPr>
+      <p:sp>
+        <p:nvSpPr>
+          <p:cNvPr id="2" name="Title 1">
+            <a:extLst>
+              <a:ext uri="{FF2B5EF4-FFF2-40B4-BE49-F238E27FC236}">
+                <a16:creationId xmlns:a16="http://schemas.microsoft.com/office/drawing/2014/main" id="{F7974661-61FC-4E94-95C6-05145FF33D69}"/>
+              </a:ext>
+            </a:extLst>
+          </p:cNvPr>
+          <p:cNvSpPr>
+            <a:spLocks noGrp="1"/>
+          </p:cNvSpPr>
+          <p:nvPr>
+            <p:ph type="title"/>
+          </p:nvPr>
+        </p:nvSpPr>
+        <p:spPr/>
+        <p:txBody>
+          <a:bodyPr/>
+          <a:lstStyle/>
+          <a:p>
+            <a:pPr algn="ctr"/>
+            <a:r>
+              <a:rPr lang="en-AU" b="1" dirty="0"/>
+              <a:t>Wireframes – Blog Post Page</a:t>
+            </a:r>
+          </a:p>
+        </p:txBody>
+      </p:sp>
+      <p:pic>
+        <p:nvPicPr>
+          <p:cNvPr id="6" name="Content Placeholder 5" descr="Graphical user interface&#10;&#10;Description automatically generated">
+            <a:extLst>
+              <a:ext uri="{FF2B5EF4-FFF2-40B4-BE49-F238E27FC236}">
+                <a16:creationId xmlns:a16="http://schemas.microsoft.com/office/drawing/2014/main" id="{9BFEFB22-F194-4128-8BA0-166697140859}"/>
+              </a:ext>
+            </a:extLst>
+          </p:cNvPr>
+          <p:cNvPicPr>
+            <a:picLocks noGrp="1" noChangeAspect="1"/>
+          </p:cNvPicPr>
+          <p:nvPr>
+            <p:ph idx="1"/>
+          </p:nvPr>
+        </p:nvPicPr>
+        <p:blipFill>
+          <a:blip r:embed="rId2">
+            <a:extLst>
+              <a:ext uri="{28A0092B-C50C-407E-A947-70E740481C1C}">
+                <a14:useLocalDpi xmlns:a14="http://schemas.microsoft.com/office/drawing/2010/main" val="0"/>
+              </a:ext>
+            </a:extLst>
+          </a:blip>
+          <a:stretch>
+            <a:fillRect/>
+          </a:stretch>
+        </p:blipFill>
+        <p:spPr>
+          <a:xfrm>
+            <a:off x="890828" y="1825625"/>
+            <a:ext cx="10410343" cy="4351338"/>
+          </a:xfrm>
+        </p:spPr>
+      </p:pic>
+    </p:spTree>
+    <p:extLst>
+      <p:ext uri="{BB962C8B-B14F-4D97-AF65-F5344CB8AC3E}">
+        <p14:creationId xmlns:p14="http://schemas.microsoft.com/office/powerpoint/2010/main" val="566462690"/>
+      </p:ext>
+    </p:extLst>
+  </p:cSld>
+  <p:clrMapOvr>
+    <a:masterClrMapping/>
+  </p:clrMapOvr>
+</p:sld>
+</file>
+
+<file path=ppt/slides/slide12.xml><?xml version="1.0" encoding="utf-8"?>
+<p:sld xmlns:a="http://schemas.openxmlformats.org/drawingml/2006/main" xmlns:r="http://schemas.openxmlformats.org/officeDocument/2006/relationships" xmlns:p="http://schemas.openxmlformats.org/presentationml/2006/main">
+  <p:cSld>
+    <p:spTree>
+      <p:nvGrpSpPr>
+        <p:cNvPr id="1" name=""/>
+        <p:cNvGrpSpPr/>
+        <p:nvPr/>
+      </p:nvGrpSpPr>
+      <p:grpSpPr>
+        <a:xfrm>
+          <a:off x="0" y="0"/>
+          <a:ext cx="0" cy="0"/>
+          <a:chOff x="0" y="0"/>
+          <a:chExt cx="0" cy="0"/>
+        </a:xfrm>
+      </p:grpSpPr>
+      <p:sp>
+        <p:nvSpPr>
+          <p:cNvPr id="2" name="Title 1">
+            <a:extLst>
+              <a:ext uri="{FF2B5EF4-FFF2-40B4-BE49-F238E27FC236}">
+                <a16:creationId xmlns:a16="http://schemas.microsoft.com/office/drawing/2014/main" id="{F7974661-61FC-4E94-95C6-05145FF33D69}"/>
+              </a:ext>
+            </a:extLst>
+          </p:cNvPr>
+          <p:cNvSpPr>
+            <a:spLocks noGrp="1"/>
+          </p:cNvSpPr>
+          <p:nvPr>
+            <p:ph type="title"/>
+          </p:nvPr>
+        </p:nvSpPr>
+        <p:spPr/>
+        <p:txBody>
+          <a:bodyPr/>
+          <a:lstStyle/>
+          <a:p>
+            <a:pPr algn="ctr"/>
+            <a:r>
+              <a:rPr lang="en-AU" b="1" dirty="0"/>
+              <a:t>Blog Post Page</a:t>
+            </a:r>
+          </a:p>
+        </p:txBody>
+      </p:sp>
+      <p:pic>
+        <p:nvPicPr>
+          <p:cNvPr id="6" name="Content Placeholder 5">
+            <a:extLst>
+              <a:ext uri="{FF2B5EF4-FFF2-40B4-BE49-F238E27FC236}">
+                <a16:creationId xmlns:a16="http://schemas.microsoft.com/office/drawing/2014/main" id="{39179D5E-B207-4293-84DE-C75218483F08}"/>
+              </a:ext>
+            </a:extLst>
+          </p:cNvPr>
+          <p:cNvPicPr>
+            <a:picLocks noGrp="1" noChangeAspect="1"/>
+          </p:cNvPicPr>
+          <p:nvPr>
+            <p:ph idx="1"/>
+          </p:nvPr>
+        </p:nvPicPr>
+        <p:blipFill>
+          <a:blip r:embed="rId2"/>
+          <a:stretch>
+            <a:fillRect/>
+          </a:stretch>
+        </p:blipFill>
+        <p:spPr>
+          <a:xfrm>
+            <a:off x="838200" y="2149904"/>
+            <a:ext cx="10515600" cy="3702779"/>
+          </a:xfrm>
+        </p:spPr>
+      </p:pic>
+    </p:spTree>
+    <p:extLst>
+      <p:ext uri="{BB962C8B-B14F-4D97-AF65-F5344CB8AC3E}">
+        <p14:creationId xmlns:p14="http://schemas.microsoft.com/office/powerpoint/2010/main" val="3883911841"/>
+      </p:ext>
+    </p:extLst>
+  </p:cSld>
+  <p:clrMapOvr>
+    <a:masterClrMapping/>
+  </p:clrMapOvr>
+</p:sld>
+</file>
+
 <file path=ppt/slides/slide2.xml><?xml version="1.0" encoding="utf-8"?>
 <p:sld xmlns:a="http://schemas.openxmlformats.org/drawingml/2006/main" xmlns:r="http://schemas.openxmlformats.org/officeDocument/2006/relationships" xmlns:p="http://schemas.openxmlformats.org/presentationml/2006/main">
   <p:cSld>
@@ -3552,39 +3831,617 @@
           <a:bodyPr/>
           <a:lstStyle/>
           <a:p>
-            <a:endParaRPr lang="en-AU"/>
-          </a:p>
-        </p:txBody>
-      </p:sp>
-      <p:sp>
-        <p:nvSpPr>
-          <p:cNvPr id="3" name="Content Placeholder 2">
-            <a:extLst>
-              <a:ext uri="{FF2B5EF4-FFF2-40B4-BE49-F238E27FC236}">
-                <a16:creationId xmlns:a16="http://schemas.microsoft.com/office/drawing/2014/main" id="{5963C63E-9D8F-448A-817F-385BA56CFEDE}"/>
-              </a:ext>
-            </a:extLst>
-          </p:cNvPr>
-          <p:cNvSpPr>
-            <a:spLocks noGrp="1"/>
-          </p:cNvSpPr>
+            <a:pPr algn="ctr"/>
+            <a:r>
+              <a:rPr lang="en-AU" b="1" dirty="0"/>
+              <a:t>Wireframes – Index Page</a:t>
+            </a:r>
+          </a:p>
+        </p:txBody>
+      </p:sp>
+      <p:pic>
+        <p:nvPicPr>
+          <p:cNvPr id="15" name="Content Placeholder 14">
+            <a:extLst>
+              <a:ext uri="{FF2B5EF4-FFF2-40B4-BE49-F238E27FC236}">
+                <a16:creationId xmlns:a16="http://schemas.microsoft.com/office/drawing/2014/main" id="{4CCD042B-1938-44E8-A318-2039518DCA05}"/>
+              </a:ext>
+            </a:extLst>
+          </p:cNvPr>
+          <p:cNvPicPr>
+            <a:picLocks noGrp="1" noChangeAspect="1"/>
+          </p:cNvPicPr>
           <p:nvPr>
             <p:ph idx="1"/>
           </p:nvPr>
-        </p:nvSpPr>
-        <p:spPr/>
-        <p:txBody>
-          <a:bodyPr/>
-          <a:lstStyle/>
-          <a:p>
-            <a:endParaRPr lang="en-AU"/>
-          </a:p>
-        </p:txBody>
-      </p:sp>
+        </p:nvPicPr>
+        <p:blipFill>
+          <a:blip r:embed="rId2">
+            <a:extLst>
+              <a:ext uri="{28A0092B-C50C-407E-A947-70E740481C1C}">
+                <a14:useLocalDpi xmlns:a14="http://schemas.microsoft.com/office/drawing/2010/main" val="0"/>
+              </a:ext>
+            </a:extLst>
+          </a:blip>
+          <a:stretch>
+            <a:fillRect/>
+          </a:stretch>
+        </p:blipFill>
+        <p:spPr>
+          <a:xfrm>
+            <a:off x="870798" y="1825625"/>
+            <a:ext cx="10450404" cy="4351338"/>
+          </a:xfrm>
+        </p:spPr>
+      </p:pic>
     </p:spTree>
     <p:extLst>
       <p:ext uri="{BB962C8B-B14F-4D97-AF65-F5344CB8AC3E}">
         <p14:creationId xmlns:p14="http://schemas.microsoft.com/office/powerpoint/2010/main" val="4262099132"/>
+      </p:ext>
+    </p:extLst>
+  </p:cSld>
+  <p:clrMapOvr>
+    <a:masterClrMapping/>
+  </p:clrMapOvr>
+</p:sld>
+</file>
+
+<file path=ppt/slides/slide4.xml><?xml version="1.0" encoding="utf-8"?>
+<p:sld xmlns:a="http://schemas.openxmlformats.org/drawingml/2006/main" xmlns:r="http://schemas.openxmlformats.org/officeDocument/2006/relationships" xmlns:p="http://schemas.openxmlformats.org/presentationml/2006/main">
+  <p:cSld>
+    <p:spTree>
+      <p:nvGrpSpPr>
+        <p:cNvPr id="1" name=""/>
+        <p:cNvGrpSpPr/>
+        <p:nvPr/>
+      </p:nvGrpSpPr>
+      <p:grpSpPr>
+        <a:xfrm>
+          <a:off x="0" y="0"/>
+          <a:ext cx="0" cy="0"/>
+          <a:chOff x="0" y="0"/>
+          <a:chExt cx="0" cy="0"/>
+        </a:xfrm>
+      </p:grpSpPr>
+      <p:sp>
+        <p:nvSpPr>
+          <p:cNvPr id="2" name="Title 1">
+            <a:extLst>
+              <a:ext uri="{FF2B5EF4-FFF2-40B4-BE49-F238E27FC236}">
+                <a16:creationId xmlns:a16="http://schemas.microsoft.com/office/drawing/2014/main" id="{F7974661-61FC-4E94-95C6-05145FF33D69}"/>
+              </a:ext>
+            </a:extLst>
+          </p:cNvPr>
+          <p:cNvSpPr>
+            <a:spLocks noGrp="1"/>
+          </p:cNvSpPr>
+          <p:nvPr>
+            <p:ph type="title"/>
+          </p:nvPr>
+        </p:nvSpPr>
+        <p:spPr/>
+        <p:txBody>
+          <a:bodyPr/>
+          <a:lstStyle/>
+          <a:p>
+            <a:pPr algn="ctr"/>
+            <a:r>
+              <a:rPr lang="en-AU" b="1" dirty="0"/>
+              <a:t>Index Page</a:t>
+            </a:r>
+          </a:p>
+        </p:txBody>
+      </p:sp>
+      <p:pic>
+        <p:nvPicPr>
+          <p:cNvPr id="8" name="Content Placeholder 7" descr="Graphical user interface, application&#10;&#10;Description automatically generated">
+            <a:extLst>
+              <a:ext uri="{FF2B5EF4-FFF2-40B4-BE49-F238E27FC236}">
+                <a16:creationId xmlns:a16="http://schemas.microsoft.com/office/drawing/2014/main" id="{B3C8AF85-FB49-40E5-BEEB-A671D5C805F6}"/>
+              </a:ext>
+            </a:extLst>
+          </p:cNvPr>
+          <p:cNvPicPr>
+            <a:picLocks noGrp="1" noChangeAspect="1"/>
+          </p:cNvPicPr>
+          <p:nvPr>
+            <p:ph idx="1"/>
+          </p:nvPr>
+        </p:nvPicPr>
+        <p:blipFill>
+          <a:blip r:embed="rId2">
+            <a:extLst>
+              <a:ext uri="{28A0092B-C50C-407E-A947-70E740481C1C}">
+                <a14:useLocalDpi xmlns:a14="http://schemas.microsoft.com/office/drawing/2010/main" val="0"/>
+              </a:ext>
+            </a:extLst>
+          </a:blip>
+          <a:stretch>
+            <a:fillRect/>
+          </a:stretch>
+        </p:blipFill>
+        <p:spPr>
+          <a:xfrm>
+            <a:off x="838200" y="2166673"/>
+            <a:ext cx="10515600" cy="3669242"/>
+          </a:xfrm>
+        </p:spPr>
+      </p:pic>
+    </p:spTree>
+    <p:extLst>
+      <p:ext uri="{BB962C8B-B14F-4D97-AF65-F5344CB8AC3E}">
+        <p14:creationId xmlns:p14="http://schemas.microsoft.com/office/powerpoint/2010/main" val="737256864"/>
+      </p:ext>
+    </p:extLst>
+  </p:cSld>
+  <p:clrMapOvr>
+    <a:masterClrMapping/>
+  </p:clrMapOvr>
+</p:sld>
+</file>
+
+<file path=ppt/slides/slide5.xml><?xml version="1.0" encoding="utf-8"?>
+<p:sld xmlns:a="http://schemas.openxmlformats.org/drawingml/2006/main" xmlns:r="http://schemas.openxmlformats.org/officeDocument/2006/relationships" xmlns:p="http://schemas.openxmlformats.org/presentationml/2006/main">
+  <p:cSld>
+    <p:spTree>
+      <p:nvGrpSpPr>
+        <p:cNvPr id="1" name=""/>
+        <p:cNvGrpSpPr/>
+        <p:nvPr/>
+      </p:nvGrpSpPr>
+      <p:grpSpPr>
+        <a:xfrm>
+          <a:off x="0" y="0"/>
+          <a:ext cx="0" cy="0"/>
+          <a:chOff x="0" y="0"/>
+          <a:chExt cx="0" cy="0"/>
+        </a:xfrm>
+      </p:grpSpPr>
+      <p:sp>
+        <p:nvSpPr>
+          <p:cNvPr id="2" name="Title 1">
+            <a:extLst>
+              <a:ext uri="{FF2B5EF4-FFF2-40B4-BE49-F238E27FC236}">
+                <a16:creationId xmlns:a16="http://schemas.microsoft.com/office/drawing/2014/main" id="{F7974661-61FC-4E94-95C6-05145FF33D69}"/>
+              </a:ext>
+            </a:extLst>
+          </p:cNvPr>
+          <p:cNvSpPr>
+            <a:spLocks noGrp="1"/>
+          </p:cNvSpPr>
+          <p:nvPr>
+            <p:ph type="title"/>
+          </p:nvPr>
+        </p:nvSpPr>
+        <p:spPr/>
+        <p:txBody>
+          <a:bodyPr/>
+          <a:lstStyle/>
+          <a:p>
+            <a:pPr algn="ctr"/>
+            <a:r>
+              <a:rPr lang="en-AU" b="1" dirty="0"/>
+              <a:t>Wireframes – About Page</a:t>
+            </a:r>
+          </a:p>
+        </p:txBody>
+      </p:sp>
+      <p:pic>
+        <p:nvPicPr>
+          <p:cNvPr id="8" name="Content Placeholder 7" descr="Text&#10;&#10;Description automatically generated">
+            <a:extLst>
+              <a:ext uri="{FF2B5EF4-FFF2-40B4-BE49-F238E27FC236}">
+                <a16:creationId xmlns:a16="http://schemas.microsoft.com/office/drawing/2014/main" id="{2AB4FB2B-0F28-4BAE-9DF8-203C30A047DB}"/>
+              </a:ext>
+            </a:extLst>
+          </p:cNvPr>
+          <p:cNvPicPr>
+            <a:picLocks noGrp="1" noChangeAspect="1"/>
+          </p:cNvPicPr>
+          <p:nvPr>
+            <p:ph idx="1"/>
+          </p:nvPr>
+        </p:nvPicPr>
+        <p:blipFill>
+          <a:blip r:embed="rId2">
+            <a:extLst>
+              <a:ext uri="{28A0092B-C50C-407E-A947-70E740481C1C}">
+                <a14:useLocalDpi xmlns:a14="http://schemas.microsoft.com/office/drawing/2010/main" val="0"/>
+              </a:ext>
+            </a:extLst>
+          </a:blip>
+          <a:stretch>
+            <a:fillRect/>
+          </a:stretch>
+        </p:blipFill>
+        <p:spPr>
+          <a:xfrm>
+            <a:off x="854290" y="1825625"/>
+            <a:ext cx="10483420" cy="4351338"/>
+          </a:xfrm>
+        </p:spPr>
+      </p:pic>
+    </p:spTree>
+    <p:extLst>
+      <p:ext uri="{BB962C8B-B14F-4D97-AF65-F5344CB8AC3E}">
+        <p14:creationId xmlns:p14="http://schemas.microsoft.com/office/powerpoint/2010/main" val="51480100"/>
+      </p:ext>
+    </p:extLst>
+  </p:cSld>
+  <p:clrMapOvr>
+    <a:masterClrMapping/>
+  </p:clrMapOvr>
+</p:sld>
+</file>
+
+<file path=ppt/slides/slide6.xml><?xml version="1.0" encoding="utf-8"?>
+<p:sld xmlns:a="http://schemas.openxmlformats.org/drawingml/2006/main" xmlns:r="http://schemas.openxmlformats.org/officeDocument/2006/relationships" xmlns:p="http://schemas.openxmlformats.org/presentationml/2006/main">
+  <p:cSld>
+    <p:spTree>
+      <p:nvGrpSpPr>
+        <p:cNvPr id="1" name=""/>
+        <p:cNvGrpSpPr/>
+        <p:nvPr/>
+      </p:nvGrpSpPr>
+      <p:grpSpPr>
+        <a:xfrm>
+          <a:off x="0" y="0"/>
+          <a:ext cx="0" cy="0"/>
+          <a:chOff x="0" y="0"/>
+          <a:chExt cx="0" cy="0"/>
+        </a:xfrm>
+      </p:grpSpPr>
+      <p:sp>
+        <p:nvSpPr>
+          <p:cNvPr id="2" name="Title 1">
+            <a:extLst>
+              <a:ext uri="{FF2B5EF4-FFF2-40B4-BE49-F238E27FC236}">
+                <a16:creationId xmlns:a16="http://schemas.microsoft.com/office/drawing/2014/main" id="{F7974661-61FC-4E94-95C6-05145FF33D69}"/>
+              </a:ext>
+            </a:extLst>
+          </p:cNvPr>
+          <p:cNvSpPr>
+            <a:spLocks noGrp="1"/>
+          </p:cNvSpPr>
+          <p:nvPr>
+            <p:ph type="title"/>
+          </p:nvPr>
+        </p:nvSpPr>
+        <p:spPr/>
+        <p:txBody>
+          <a:bodyPr/>
+          <a:lstStyle/>
+          <a:p>
+            <a:pPr algn="ctr"/>
+            <a:r>
+              <a:rPr lang="en-AU" b="1" dirty="0"/>
+              <a:t>About Page</a:t>
+            </a:r>
+          </a:p>
+        </p:txBody>
+      </p:sp>
+      <p:pic>
+        <p:nvPicPr>
+          <p:cNvPr id="6" name="Content Placeholder 5" descr="Graphical user interface, text, application&#10;&#10;Description automatically generated">
+            <a:extLst>
+              <a:ext uri="{FF2B5EF4-FFF2-40B4-BE49-F238E27FC236}">
+                <a16:creationId xmlns:a16="http://schemas.microsoft.com/office/drawing/2014/main" id="{CA87E240-A8D0-4A0C-B690-C5E1247F979A}"/>
+              </a:ext>
+            </a:extLst>
+          </p:cNvPr>
+          <p:cNvPicPr>
+            <a:picLocks noGrp="1" noChangeAspect="1"/>
+          </p:cNvPicPr>
+          <p:nvPr>
+            <p:ph idx="1"/>
+          </p:nvPr>
+        </p:nvPicPr>
+        <p:blipFill>
+          <a:blip r:embed="rId2">
+            <a:extLst>
+              <a:ext uri="{28A0092B-C50C-407E-A947-70E740481C1C}">
+                <a14:useLocalDpi xmlns:a14="http://schemas.microsoft.com/office/drawing/2010/main" val="0"/>
+              </a:ext>
+            </a:extLst>
+          </a:blip>
+          <a:stretch>
+            <a:fillRect/>
+          </a:stretch>
+        </p:blipFill>
+        <p:spPr>
+          <a:xfrm>
+            <a:off x="838200" y="2156608"/>
+            <a:ext cx="10515600" cy="3689371"/>
+          </a:xfrm>
+        </p:spPr>
+      </p:pic>
+    </p:spTree>
+    <p:extLst>
+      <p:ext uri="{BB962C8B-B14F-4D97-AF65-F5344CB8AC3E}">
+        <p14:creationId xmlns:p14="http://schemas.microsoft.com/office/powerpoint/2010/main" val="391938684"/>
+      </p:ext>
+    </p:extLst>
+  </p:cSld>
+  <p:clrMapOvr>
+    <a:masterClrMapping/>
+  </p:clrMapOvr>
+</p:sld>
+</file>
+
+<file path=ppt/slides/slide7.xml><?xml version="1.0" encoding="utf-8"?>
+<p:sld xmlns:a="http://schemas.openxmlformats.org/drawingml/2006/main" xmlns:r="http://schemas.openxmlformats.org/officeDocument/2006/relationships" xmlns:p="http://schemas.openxmlformats.org/presentationml/2006/main">
+  <p:cSld>
+    <p:spTree>
+      <p:nvGrpSpPr>
+        <p:cNvPr id="1" name=""/>
+        <p:cNvGrpSpPr/>
+        <p:nvPr/>
+      </p:nvGrpSpPr>
+      <p:grpSpPr>
+        <a:xfrm>
+          <a:off x="0" y="0"/>
+          <a:ext cx="0" cy="0"/>
+          <a:chOff x="0" y="0"/>
+          <a:chExt cx="0" cy="0"/>
+        </a:xfrm>
+      </p:grpSpPr>
+      <p:sp>
+        <p:nvSpPr>
+          <p:cNvPr id="2" name="Title 1">
+            <a:extLst>
+              <a:ext uri="{FF2B5EF4-FFF2-40B4-BE49-F238E27FC236}">
+                <a16:creationId xmlns:a16="http://schemas.microsoft.com/office/drawing/2014/main" id="{F7974661-61FC-4E94-95C6-05145FF33D69}"/>
+              </a:ext>
+            </a:extLst>
+          </p:cNvPr>
+          <p:cNvSpPr>
+            <a:spLocks noGrp="1"/>
+          </p:cNvSpPr>
+          <p:nvPr>
+            <p:ph type="title"/>
+          </p:nvPr>
+        </p:nvSpPr>
+        <p:spPr/>
+        <p:txBody>
+          <a:bodyPr/>
+          <a:lstStyle/>
+          <a:p>
+            <a:pPr algn="ctr"/>
+            <a:r>
+              <a:rPr lang="en-AU" b="1" dirty="0"/>
+              <a:t>Wireframes – Projects Page</a:t>
+            </a:r>
+          </a:p>
+        </p:txBody>
+      </p:sp>
+      <p:pic>
+        <p:nvPicPr>
+          <p:cNvPr id="6" name="Content Placeholder 5" descr="Graphical user interface, application&#10;&#10;Description automatically generated">
+            <a:extLst>
+              <a:ext uri="{FF2B5EF4-FFF2-40B4-BE49-F238E27FC236}">
+                <a16:creationId xmlns:a16="http://schemas.microsoft.com/office/drawing/2014/main" id="{79D91AF8-C7EF-46B1-8B94-F23E81505EFB}"/>
+              </a:ext>
+            </a:extLst>
+          </p:cNvPr>
+          <p:cNvPicPr>
+            <a:picLocks noGrp="1" noChangeAspect="1"/>
+          </p:cNvPicPr>
+          <p:nvPr>
+            <p:ph idx="1"/>
+          </p:nvPr>
+        </p:nvPicPr>
+        <p:blipFill>
+          <a:blip r:embed="rId2">
+            <a:extLst>
+              <a:ext uri="{28A0092B-C50C-407E-A947-70E740481C1C}">
+                <a14:useLocalDpi xmlns:a14="http://schemas.microsoft.com/office/drawing/2010/main" val="0"/>
+              </a:ext>
+            </a:extLst>
+          </a:blip>
+          <a:stretch>
+            <a:fillRect/>
+          </a:stretch>
+        </p:blipFill>
+        <p:spPr>
+          <a:xfrm>
+            <a:off x="882267" y="1825625"/>
+            <a:ext cx="10427466" cy="4351338"/>
+          </a:xfrm>
+        </p:spPr>
+      </p:pic>
+    </p:spTree>
+    <p:extLst>
+      <p:ext uri="{BB962C8B-B14F-4D97-AF65-F5344CB8AC3E}">
+        <p14:creationId xmlns:p14="http://schemas.microsoft.com/office/powerpoint/2010/main" val="1029282750"/>
+      </p:ext>
+    </p:extLst>
+  </p:cSld>
+  <p:clrMapOvr>
+    <a:masterClrMapping/>
+  </p:clrMapOvr>
+</p:sld>
+</file>
+
+<file path=ppt/slides/slide8.xml><?xml version="1.0" encoding="utf-8"?>
+<p:sld xmlns:a="http://schemas.openxmlformats.org/drawingml/2006/main" xmlns:r="http://schemas.openxmlformats.org/officeDocument/2006/relationships" xmlns:p="http://schemas.openxmlformats.org/presentationml/2006/main">
+  <p:cSld>
+    <p:spTree>
+      <p:nvGrpSpPr>
+        <p:cNvPr id="1" name=""/>
+        <p:cNvGrpSpPr/>
+        <p:nvPr/>
+      </p:nvGrpSpPr>
+      <p:grpSpPr>
+        <a:xfrm>
+          <a:off x="0" y="0"/>
+          <a:ext cx="0" cy="0"/>
+          <a:chOff x="0" y="0"/>
+          <a:chExt cx="0" cy="0"/>
+        </a:xfrm>
+      </p:grpSpPr>
+      <p:sp>
+        <p:nvSpPr>
+          <p:cNvPr id="2" name="Title 1">
+            <a:extLst>
+              <a:ext uri="{FF2B5EF4-FFF2-40B4-BE49-F238E27FC236}">
+                <a16:creationId xmlns:a16="http://schemas.microsoft.com/office/drawing/2014/main" id="{F7974661-61FC-4E94-95C6-05145FF33D69}"/>
+              </a:ext>
+            </a:extLst>
+          </p:cNvPr>
+          <p:cNvSpPr>
+            <a:spLocks noGrp="1"/>
+          </p:cNvSpPr>
+          <p:nvPr>
+            <p:ph type="title"/>
+          </p:nvPr>
+        </p:nvSpPr>
+        <p:spPr/>
+        <p:txBody>
+          <a:bodyPr/>
+          <a:lstStyle/>
+          <a:p>
+            <a:pPr algn="ctr"/>
+            <a:r>
+              <a:rPr lang="en-AU" b="1" dirty="0"/>
+              <a:t>Projects Page</a:t>
+            </a:r>
+          </a:p>
+        </p:txBody>
+      </p:sp>
+      <p:pic>
+        <p:nvPicPr>
+          <p:cNvPr id="6" name="Content Placeholder 5" descr="Graphical user interface, application&#10;&#10;Description automatically generated">
+            <a:extLst>
+              <a:ext uri="{FF2B5EF4-FFF2-40B4-BE49-F238E27FC236}">
+                <a16:creationId xmlns:a16="http://schemas.microsoft.com/office/drawing/2014/main" id="{218451F4-BC2C-47FB-8680-AB65E8EF9748}"/>
+              </a:ext>
+            </a:extLst>
+          </p:cNvPr>
+          <p:cNvPicPr>
+            <a:picLocks noGrp="1" noChangeAspect="1"/>
+          </p:cNvPicPr>
+          <p:nvPr>
+            <p:ph idx="1"/>
+          </p:nvPr>
+        </p:nvPicPr>
+        <p:blipFill>
+          <a:blip r:embed="rId2">
+            <a:extLst>
+              <a:ext uri="{28A0092B-C50C-407E-A947-70E740481C1C}">
+                <a14:useLocalDpi xmlns:a14="http://schemas.microsoft.com/office/drawing/2010/main" val="0"/>
+              </a:ext>
+            </a:extLst>
+          </a:blip>
+          <a:stretch>
+            <a:fillRect/>
+          </a:stretch>
+        </p:blipFill>
+        <p:spPr>
+          <a:xfrm>
+            <a:off x="838200" y="2159436"/>
+            <a:ext cx="10515600" cy="3683716"/>
+          </a:xfrm>
+        </p:spPr>
+      </p:pic>
+    </p:spTree>
+    <p:extLst>
+      <p:ext uri="{BB962C8B-B14F-4D97-AF65-F5344CB8AC3E}">
+        <p14:creationId xmlns:p14="http://schemas.microsoft.com/office/powerpoint/2010/main" val="3939094612"/>
+      </p:ext>
+    </p:extLst>
+  </p:cSld>
+  <p:clrMapOvr>
+    <a:masterClrMapping/>
+  </p:clrMapOvr>
+</p:sld>
+</file>
+
+<file path=ppt/slides/slide9.xml><?xml version="1.0" encoding="utf-8"?>
+<p:sld xmlns:a="http://schemas.openxmlformats.org/drawingml/2006/main" xmlns:r="http://schemas.openxmlformats.org/officeDocument/2006/relationships" xmlns:p="http://schemas.openxmlformats.org/presentationml/2006/main">
+  <p:cSld>
+    <p:spTree>
+      <p:nvGrpSpPr>
+        <p:cNvPr id="1" name=""/>
+        <p:cNvGrpSpPr/>
+        <p:nvPr/>
+      </p:nvGrpSpPr>
+      <p:grpSpPr>
+        <a:xfrm>
+          <a:off x="0" y="0"/>
+          <a:ext cx="0" cy="0"/>
+          <a:chOff x="0" y="0"/>
+          <a:chExt cx="0" cy="0"/>
+        </a:xfrm>
+      </p:grpSpPr>
+      <p:sp>
+        <p:nvSpPr>
+          <p:cNvPr id="2" name="Title 1">
+            <a:extLst>
+              <a:ext uri="{FF2B5EF4-FFF2-40B4-BE49-F238E27FC236}">
+                <a16:creationId xmlns:a16="http://schemas.microsoft.com/office/drawing/2014/main" id="{F7974661-61FC-4E94-95C6-05145FF33D69}"/>
+              </a:ext>
+            </a:extLst>
+          </p:cNvPr>
+          <p:cNvSpPr>
+            <a:spLocks noGrp="1"/>
+          </p:cNvSpPr>
+          <p:nvPr>
+            <p:ph type="title"/>
+          </p:nvPr>
+        </p:nvSpPr>
+        <p:spPr/>
+        <p:txBody>
+          <a:bodyPr/>
+          <a:lstStyle/>
+          <a:p>
+            <a:pPr algn="ctr"/>
+            <a:r>
+              <a:rPr lang="en-AU" b="1" dirty="0"/>
+              <a:t>Wireframes – Blogs Page</a:t>
+            </a:r>
+          </a:p>
+        </p:txBody>
+      </p:sp>
+      <p:pic>
+        <p:nvPicPr>
+          <p:cNvPr id="6" name="Content Placeholder 5" descr="Graphical user interface, diagram&#10;&#10;Description automatically generated">
+            <a:extLst>
+              <a:ext uri="{FF2B5EF4-FFF2-40B4-BE49-F238E27FC236}">
+                <a16:creationId xmlns:a16="http://schemas.microsoft.com/office/drawing/2014/main" id="{25B05E12-1D9A-4A01-8E74-EF0BD3AD94FA}"/>
+              </a:ext>
+            </a:extLst>
+          </p:cNvPr>
+          <p:cNvPicPr>
+            <a:picLocks noGrp="1" noChangeAspect="1"/>
+          </p:cNvPicPr>
+          <p:nvPr>
+            <p:ph idx="1"/>
+          </p:nvPr>
+        </p:nvPicPr>
+        <p:blipFill>
+          <a:blip r:embed="rId2">
+            <a:extLst>
+              <a:ext uri="{28A0092B-C50C-407E-A947-70E740481C1C}">
+                <a14:useLocalDpi xmlns:a14="http://schemas.microsoft.com/office/drawing/2010/main" val="0"/>
+              </a:ext>
+            </a:extLst>
+          </a:blip>
+          <a:stretch>
+            <a:fillRect/>
+          </a:stretch>
+        </p:blipFill>
+        <p:spPr>
+          <a:xfrm>
+            <a:off x="887362" y="1825625"/>
+            <a:ext cx="10417275" cy="4351338"/>
+          </a:xfrm>
+        </p:spPr>
+      </p:pic>
+    </p:spTree>
+    <p:extLst>
+      <p:ext uri="{BB962C8B-B14F-4D97-AF65-F5344CB8AC3E}">
+        <p14:creationId xmlns:p14="http://schemas.microsoft.com/office/powerpoint/2010/main" val="751381871"/>
       </p:ext>
     </p:extLst>
   </p:cSld>

</xml_diff>